<commit_message>
Presentation updated (AWS, links, costs)
</commit_message>
<xml_diff>
--- a/mskalmykov_diploma.pptx
+++ b/mskalmykov_diploma.pptx
@@ -7,10 +7,10 @@
     <p:sldMasterId id="2147483663" r:id="rId7"/>
   </p:sldMasterIdLst>
   <p:notesMasterIdLst>
-    <p:notesMasterId r:id="rId14"/>
+    <p:notesMasterId r:id="rId15"/>
   </p:notesMasterIdLst>
   <p:handoutMasterIdLst>
-    <p:handoutMasterId r:id="rId15"/>
+    <p:handoutMasterId r:id="rId16"/>
   </p:handoutMasterIdLst>
   <p:sldIdLst>
     <p:sldId id="256" r:id="rId8"/>
@@ -19,6 +19,7 @@
     <p:sldId id="259" r:id="rId11"/>
     <p:sldId id="261" r:id="rId12"/>
     <p:sldId id="267" r:id="rId13"/>
+    <p:sldId id="268" r:id="rId14"/>
   </p:sldIdLst>
   <p:sldSz cx="9144000" cy="5143500" type="screen16x9"/>
   <p:notesSz cx="6858000" cy="9144000"/>
@@ -9783,7 +9784,7 @@
           </a:ln>
           <a:extLst>
             <a:ext uri="{C572A759-6A51-4108-AA02-DFA0A04FC94B}">
-              <ma14:wrappingTextBoxFlag xmlns:ma14="http://schemas.microsoft.com/office/mac/drawingml/2011/main" xmlns="" val="1"/>
+              <ma14:wrappingTextBoxFlag xmlns="" xmlns:ma14="http://schemas.microsoft.com/office/mac/drawingml/2011/main" val="1"/>
             </a:ext>
           </a:extLst>
         </p:spPr>
@@ -22269,11 +22270,34 @@
               <a:buChar char="o"/>
             </a:pPr>
             <a:r>
+              <a:rPr lang="en-US" sz="1400" dirty="0" smtClean="0">
+                <a:latin typeface="Arial" panose="020B0604020202020204" pitchFamily="34" charset="0"/>
+                <a:cs typeface="Arial" panose="020B0604020202020204" pitchFamily="34" charset="0"/>
+              </a:rPr>
+              <a:t>Use NHL API</a:t>
+            </a:r>
+          </a:p>
+          <a:p>
+            <a:pPr marL="285750" indent="-285750">
+              <a:buClr>
+                <a:srgbClr val="00B0F0"/>
+              </a:buClr>
+              <a:buFont typeface="Courier New" panose="02070309020205020404" pitchFamily="49" charset="0"/>
+              <a:buChar char="o"/>
+            </a:pPr>
+            <a:r>
+              <a:rPr lang="en-US" sz="1400" dirty="0" smtClean="0">
+                <a:latin typeface="Arial" panose="020B0604020202020204" pitchFamily="34" charset="0"/>
+                <a:cs typeface="Arial" panose="020B0604020202020204" pitchFamily="34" charset="0"/>
+              </a:rPr>
+              <a:t>Analyze </a:t>
+            </a:r>
+            <a:r>
               <a:rPr lang="en-US" sz="1400" dirty="0">
                 <a:latin typeface="Arial" panose="020B0604020202020204" pitchFamily="34" charset="0"/>
                 <a:cs typeface="Arial" panose="020B0604020202020204" pitchFamily="34" charset="0"/>
               </a:rPr>
-              <a:t>Analyze last 3 seasons</a:t>
+              <a:t>last 3 seasons</a:t>
             </a:r>
           </a:p>
           <a:p>
@@ -22477,7 +22501,7 @@
       </p:sp>
       <p:pic>
         <p:nvPicPr>
-          <p:cNvPr id="3" name="Рисунок 2"/>
+          <p:cNvPr id="4" name="Рисунок 3"/>
           <p:cNvPicPr>
             <a:picLocks noChangeAspect="1"/>
           </p:cNvPicPr>
@@ -22491,8 +22515,8 @@
         </p:blipFill>
         <p:spPr>
           <a:xfrm>
-            <a:off x="1018585" y="908359"/>
-            <a:ext cx="7273157" cy="3542112"/>
+            <a:off x="540488" y="820506"/>
+            <a:ext cx="7946288" cy="3869934"/>
           </a:xfrm>
           <a:prstGeom prst="rect">
             <a:avLst/>
@@ -22594,7 +22618,7 @@
       </p:sp>
       <p:pic>
         <p:nvPicPr>
-          <p:cNvPr id="4" name="Рисунок 3"/>
+          <p:cNvPr id="3" name="Рисунок 2"/>
           <p:cNvPicPr>
             <a:picLocks noChangeAspect="1"/>
           </p:cNvPicPr>
@@ -22608,8 +22632,8 @@
         </p:blipFill>
         <p:spPr>
           <a:xfrm>
-            <a:off x="1008064" y="601376"/>
-            <a:ext cx="7240388" cy="4183196"/>
+            <a:off x="846140" y="586840"/>
+            <a:ext cx="7240585" cy="4183310"/>
           </a:xfrm>
           <a:prstGeom prst="rect">
             <a:avLst/>
@@ -22711,7 +22735,7 @@
       </p:sp>
       <p:pic>
         <p:nvPicPr>
-          <p:cNvPr id="3" name="Рисунок 2"/>
+          <p:cNvPr id="4" name="Рисунок 3"/>
           <p:cNvPicPr>
             <a:picLocks noChangeAspect="1"/>
           </p:cNvPicPr>
@@ -22725,8 +22749,8 @@
         </p:blipFill>
         <p:spPr>
           <a:xfrm>
-            <a:off x="1817782" y="705669"/>
-            <a:ext cx="5923547" cy="4027463"/>
+            <a:off x="1501603" y="581206"/>
+            <a:ext cx="5911838" cy="4245433"/>
           </a:xfrm>
           <a:prstGeom prst="rect">
             <a:avLst/>
@@ -22788,7 +22812,7 @@
               <a:rPr lang="en-US" sz="2400" dirty="0" smtClean="0">
                 <a:latin typeface="Arial Black" panose="020B0A04020102020204" pitchFamily="34" charset="0"/>
               </a:rPr>
-              <a:t>LINKS</a:t>
+              <a:t>COST ANALYSIS</a:t>
             </a:r>
             <a:endParaRPr lang="ru-RU" sz="2400" dirty="0">
               <a:latin typeface="Arial Black" panose="020B0A04020102020204" pitchFamily="34" charset="0"/>
@@ -22796,181 +22820,35 @@
           </a:p>
         </p:txBody>
       </p:sp>
-      <p:sp>
-        <p:nvSpPr>
-          <p:cNvPr id="3" name="Объект 2">
-            <a:extLst>
-              <a:ext uri="{FF2B5EF4-FFF2-40B4-BE49-F238E27FC236}">
-                <a16:creationId xmlns:a16="http://schemas.microsoft.com/office/drawing/2014/main" id="{682FF77A-0E57-48D0-8784-FBBFC4DB161B}"/>
-              </a:ext>
-            </a:extLst>
-          </p:cNvPr>
-          <p:cNvSpPr>
-            <a:spLocks noGrp="1"/>
-          </p:cNvSpPr>
+      <p:pic>
+        <p:nvPicPr>
+          <p:cNvPr id="4" name="Объект 3"/>
+          <p:cNvPicPr>
+            <a:picLocks noGrp="1" noChangeAspect="1"/>
+          </p:cNvPicPr>
           <p:nvPr>
             <p:ph sz="quarter" idx="10"/>
           </p:nvPr>
-        </p:nvSpPr>
+        </p:nvPicPr>
+        <p:blipFill>
+          <a:blip r:embed="rId2" cstate="print">
+            <a:extLst>
+              <a:ext uri="{28A0092B-C50C-407E-A947-70E740481C1C}">
+                <a14:useLocalDpi xmlns:a14="http://schemas.microsoft.com/office/drawing/2010/main" val="0"/>
+              </a:ext>
+            </a:extLst>
+          </a:blip>
+          <a:stretch>
+            <a:fillRect/>
+          </a:stretch>
+        </p:blipFill>
         <p:spPr>
           <a:xfrm>
-            <a:off x="357188" y="1079500"/>
-            <a:ext cx="6121249" cy="3397250"/>
+            <a:off x="1400175" y="566446"/>
+            <a:ext cx="6143625" cy="4239967"/>
           </a:xfrm>
         </p:spPr>
-        <p:txBody>
-          <a:bodyPr/>
-          <a:lstStyle/>
-          <a:p>
-            <a:pPr>
-              <a:buClr>
-                <a:srgbClr val="00B0F0"/>
-              </a:buClr>
-              <a:buFont typeface="Courier New" panose="02070309020205020404" pitchFamily="49" charset="0"/>
-              <a:buChar char="o"/>
-            </a:pPr>
-            <a:r>
-              <a:rPr lang="en-US" sz="1400" dirty="0">
-                <a:latin typeface="Arial" panose="020B0604020202020204" pitchFamily="34" charset="0"/>
-                <a:cs typeface="Arial" panose="020B0604020202020204" pitchFamily="34" charset="0"/>
-                <a:hlinkClick r:id="rId2"/>
-              </a:rPr>
-              <a:t>https://</a:t>
-            </a:r>
-            <a:r>
-              <a:rPr lang="en-US" sz="1400" dirty="0" smtClean="0">
-                <a:latin typeface="Arial" panose="020B0604020202020204" pitchFamily="34" charset="0"/>
-                <a:cs typeface="Arial" panose="020B0604020202020204" pitchFamily="34" charset="0"/>
-                <a:hlinkClick r:id="rId2"/>
-              </a:rPr>
-              <a:t>github.com/mskalmykov/nhltop</a:t>
-            </a:r>
-            <a:r>
-              <a:rPr lang="en-US" sz="1400" dirty="0" smtClean="0">
-                <a:latin typeface="Arial" panose="020B0604020202020204" pitchFamily="34" charset="0"/>
-                <a:cs typeface="Arial" panose="020B0604020202020204" pitchFamily="34" charset="0"/>
-              </a:rPr>
-              <a:t/>
-            </a:r>
-            <a:br>
-              <a:rPr lang="en-US" sz="1400" dirty="0" smtClean="0">
-                <a:latin typeface="Arial" panose="020B0604020202020204" pitchFamily="34" charset="0"/>
-                <a:cs typeface="Arial" panose="020B0604020202020204" pitchFamily="34" charset="0"/>
-              </a:rPr>
-            </a:br>
-            <a:endParaRPr lang="en-US" sz="1400" dirty="0">
-              <a:latin typeface="Arial" panose="020B0604020202020204" pitchFamily="34" charset="0"/>
-              <a:cs typeface="Arial" panose="020B0604020202020204" pitchFamily="34" charset="0"/>
-            </a:endParaRPr>
-          </a:p>
-          <a:p>
-            <a:pPr>
-              <a:buClr>
-                <a:srgbClr val="00B0F0"/>
-              </a:buClr>
-              <a:buFont typeface="Courier New" panose="02070309020205020404" pitchFamily="49" charset="0"/>
-              <a:buChar char="o"/>
-            </a:pPr>
-            <a:r>
-              <a:rPr lang="en-US" sz="1400" dirty="0">
-                <a:latin typeface="Arial" panose="020B0604020202020204" pitchFamily="34" charset="0"/>
-                <a:cs typeface="Arial" panose="020B0604020202020204" pitchFamily="34" charset="0"/>
-                <a:hlinkClick r:id="rId3"/>
-              </a:rPr>
-              <a:t>http://</a:t>
-            </a:r>
-            <a:r>
-              <a:rPr lang="en-US" sz="1400" dirty="0" smtClean="0">
-                <a:latin typeface="Arial" panose="020B0604020202020204" pitchFamily="34" charset="0"/>
-                <a:cs typeface="Arial" panose="020B0604020202020204" pitchFamily="34" charset="0"/>
-                <a:hlinkClick r:id="rId3"/>
-              </a:rPr>
-              <a:t>msk-epam-diploma-dev.westeurope.cloudapp.azure.com</a:t>
-            </a:r>
-            <a:r>
-              <a:rPr lang="en-US" sz="1400" dirty="0">
-                <a:latin typeface="Arial" panose="020B0604020202020204" pitchFamily="34" charset="0"/>
-                <a:cs typeface="Arial" panose="020B0604020202020204" pitchFamily="34" charset="0"/>
-              </a:rPr>
-              <a:t/>
-            </a:r>
-            <a:br>
-              <a:rPr lang="en-US" sz="1400" dirty="0">
-                <a:latin typeface="Arial" panose="020B0604020202020204" pitchFamily="34" charset="0"/>
-                <a:cs typeface="Arial" panose="020B0604020202020204" pitchFamily="34" charset="0"/>
-              </a:rPr>
-            </a:br>
-            <a:endParaRPr lang="en-US" sz="1400" dirty="0" smtClean="0">
-              <a:latin typeface="Arial" panose="020B0604020202020204" pitchFamily="34" charset="0"/>
-              <a:cs typeface="Arial" panose="020B0604020202020204" pitchFamily="34" charset="0"/>
-            </a:endParaRPr>
-          </a:p>
-          <a:p>
-            <a:pPr>
-              <a:buClr>
-                <a:srgbClr val="00B0F0"/>
-              </a:buClr>
-              <a:buFont typeface="Courier New" panose="02070309020205020404" pitchFamily="49" charset="0"/>
-              <a:buChar char="o"/>
-            </a:pPr>
-            <a:r>
-              <a:rPr lang="en-US" sz="1400" dirty="0">
-                <a:latin typeface="Arial" panose="020B0604020202020204" pitchFamily="34" charset="0"/>
-                <a:cs typeface="Arial" panose="020B0604020202020204" pitchFamily="34" charset="0"/>
-                <a:hlinkClick r:id="rId4"/>
-              </a:rPr>
-              <a:t>http://</a:t>
-            </a:r>
-            <a:r>
-              <a:rPr lang="en-US" sz="1400" dirty="0" smtClean="0">
-                <a:latin typeface="Arial" panose="020B0604020202020204" pitchFamily="34" charset="0"/>
-                <a:cs typeface="Arial" panose="020B0604020202020204" pitchFamily="34" charset="0"/>
-                <a:hlinkClick r:id="rId4"/>
-              </a:rPr>
-              <a:t>msk-epam-diploma-prod.westeurope.cloudapp.azure.com</a:t>
-            </a:r>
-            <a:r>
-              <a:rPr lang="en-US" sz="1400" dirty="0">
-                <a:latin typeface="Arial" panose="020B0604020202020204" pitchFamily="34" charset="0"/>
-                <a:cs typeface="Arial" panose="020B0604020202020204" pitchFamily="34" charset="0"/>
-              </a:rPr>
-              <a:t/>
-            </a:r>
-            <a:br>
-              <a:rPr lang="en-US" sz="1400" dirty="0">
-                <a:latin typeface="Arial" panose="020B0604020202020204" pitchFamily="34" charset="0"/>
-                <a:cs typeface="Arial" panose="020B0604020202020204" pitchFamily="34" charset="0"/>
-              </a:rPr>
-            </a:br>
-            <a:r>
-              <a:rPr lang="en-US" sz="1400" dirty="0" smtClean="0">
-                <a:latin typeface="Arial" panose="020B0604020202020204" pitchFamily="34" charset="0"/>
-                <a:cs typeface="Arial" panose="020B0604020202020204" pitchFamily="34" charset="0"/>
-              </a:rPr>
-              <a:t/>
-            </a:r>
-            <a:br>
-              <a:rPr lang="en-US" sz="1400" dirty="0" smtClean="0">
-                <a:latin typeface="Arial" panose="020B0604020202020204" pitchFamily="34" charset="0"/>
-                <a:cs typeface="Arial" panose="020B0604020202020204" pitchFamily="34" charset="0"/>
-              </a:rPr>
-            </a:br>
-            <a:endParaRPr lang="en-US" sz="1400" dirty="0" smtClean="0">
-              <a:latin typeface="Arial" panose="020B0604020202020204" pitchFamily="34" charset="0"/>
-              <a:cs typeface="Arial" panose="020B0604020202020204" pitchFamily="34" charset="0"/>
-            </a:endParaRPr>
-          </a:p>
-          <a:p>
-            <a:pPr marL="0" indent="0">
-              <a:buClr>
-                <a:srgbClr val="00B0F0"/>
-              </a:buClr>
-              <a:buNone/>
-            </a:pPr>
-            <a:endParaRPr lang="ru-RU" dirty="0"/>
-          </a:p>
-        </p:txBody>
-      </p:sp>
+      </p:pic>
       <p:sp>
         <p:nvSpPr>
           <p:cNvPr id="5" name="Номер слайда 4">
@@ -23005,6 +22883,408 @@
     <p:extLst>
       <p:ext uri="{BB962C8B-B14F-4D97-AF65-F5344CB8AC3E}">
         <p14:creationId xmlns:p14="http://schemas.microsoft.com/office/powerpoint/2010/main" val="281099566"/>
+      </p:ext>
+    </p:extLst>
+  </p:cSld>
+  <p:clrMapOvr>
+    <a:masterClrMapping/>
+  </p:clrMapOvr>
+</p:sld>
+</file>
+
+<file path=ppt/slides/slide7.xml><?xml version="1.0" encoding="utf-8"?>
+<p:sld xmlns:a="http://schemas.openxmlformats.org/drawingml/2006/main" xmlns:r="http://schemas.openxmlformats.org/officeDocument/2006/relationships" xmlns:p="http://schemas.openxmlformats.org/presentationml/2006/main">
+  <p:cSld>
+    <p:spTree>
+      <p:nvGrpSpPr>
+        <p:cNvPr id="1" name=""/>
+        <p:cNvGrpSpPr/>
+        <p:nvPr/>
+      </p:nvGrpSpPr>
+      <p:grpSpPr>
+        <a:xfrm>
+          <a:off x="0" y="0"/>
+          <a:ext cx="0" cy="0"/>
+          <a:chOff x="0" y="0"/>
+          <a:chExt cx="0" cy="0"/>
+        </a:xfrm>
+      </p:grpSpPr>
+      <p:sp>
+        <p:nvSpPr>
+          <p:cNvPr id="2" name="Заголовок 1">
+            <a:extLst>
+              <a:ext uri="{FF2B5EF4-FFF2-40B4-BE49-F238E27FC236}">
+                <a16:creationId xmlns:a16="http://schemas.microsoft.com/office/drawing/2014/main" id="{FA87A3D2-472B-469E-8764-6D367FCFAE1C}"/>
+              </a:ext>
+            </a:extLst>
+          </p:cNvPr>
+          <p:cNvSpPr>
+            <a:spLocks noGrp="1"/>
+          </p:cNvSpPr>
+          <p:nvPr>
+            <p:ph type="title"/>
+          </p:nvPr>
+        </p:nvSpPr>
+        <p:spPr/>
+        <p:txBody>
+          <a:bodyPr/>
+          <a:lstStyle/>
+          <a:p>
+            <a:r>
+              <a:rPr lang="en-US" sz="2400" dirty="0" smtClean="0">
+                <a:latin typeface="Arial Black" panose="020B0A04020102020204" pitchFamily="34" charset="0"/>
+              </a:rPr>
+              <a:t>LINKS</a:t>
+            </a:r>
+            <a:endParaRPr lang="ru-RU" sz="2400" dirty="0">
+              <a:latin typeface="Arial Black" panose="020B0A04020102020204" pitchFamily="34" charset="0"/>
+            </a:endParaRPr>
+          </a:p>
+        </p:txBody>
+      </p:sp>
+      <p:sp>
+        <p:nvSpPr>
+          <p:cNvPr id="3" name="Объект 2">
+            <a:extLst>
+              <a:ext uri="{FF2B5EF4-FFF2-40B4-BE49-F238E27FC236}">
+                <a16:creationId xmlns:a16="http://schemas.microsoft.com/office/drawing/2014/main" id="{682FF77A-0E57-48D0-8784-FBBFC4DB161B}"/>
+              </a:ext>
+            </a:extLst>
+          </p:cNvPr>
+          <p:cNvSpPr>
+            <a:spLocks noGrp="1"/>
+          </p:cNvSpPr>
+          <p:nvPr>
+            <p:ph sz="quarter" idx="10"/>
+          </p:nvPr>
+        </p:nvSpPr>
+        <p:spPr>
+          <a:xfrm>
+            <a:off x="504826" y="1069975"/>
+            <a:ext cx="8172449" cy="3397250"/>
+          </a:xfrm>
+        </p:spPr>
+        <p:txBody>
+          <a:bodyPr/>
+          <a:lstStyle/>
+          <a:p>
+            <a:pPr>
+              <a:buClr>
+                <a:srgbClr val="00B0F0"/>
+              </a:buClr>
+              <a:buFont typeface="Courier New" panose="02070309020205020404" pitchFamily="49" charset="0"/>
+              <a:buChar char="o"/>
+            </a:pPr>
+            <a:r>
+              <a:rPr lang="en-US" sz="1200" dirty="0" smtClean="0">
+                <a:latin typeface="Arial" panose="020B0604020202020204" pitchFamily="34" charset="0"/>
+                <a:cs typeface="Arial" panose="020B0604020202020204" pitchFamily="34" charset="0"/>
+                <a:hlinkClick r:id="rId2"/>
+              </a:rPr>
+              <a:t>https</a:t>
+            </a:r>
+            <a:r>
+              <a:rPr lang="en-US" sz="1200" dirty="0">
+                <a:latin typeface="Arial" panose="020B0604020202020204" pitchFamily="34" charset="0"/>
+                <a:cs typeface="Arial" panose="020B0604020202020204" pitchFamily="34" charset="0"/>
+                <a:hlinkClick r:id="rId2"/>
+              </a:rPr>
+              <a:t>://</a:t>
+            </a:r>
+            <a:r>
+              <a:rPr lang="en-US" sz="1200" dirty="0" smtClean="0">
+                <a:latin typeface="Arial" panose="020B0604020202020204" pitchFamily="34" charset="0"/>
+                <a:cs typeface="Arial" panose="020B0604020202020204" pitchFamily="34" charset="0"/>
+                <a:hlinkClick r:id="rId2"/>
+              </a:rPr>
+              <a:t>github.com/mskalmykov/nhltop</a:t>
+            </a:r>
+            <a:r>
+              <a:rPr lang="en-US" sz="1200" dirty="0" smtClean="0">
+                <a:latin typeface="Arial" panose="020B0604020202020204" pitchFamily="34" charset="0"/>
+                <a:cs typeface="Arial" panose="020B0604020202020204" pitchFamily="34" charset="0"/>
+              </a:rPr>
+              <a:t> - code repository</a:t>
+            </a:r>
+            <a:r>
+              <a:rPr lang="en-US" sz="1200" dirty="0" smtClean="0">
+                <a:latin typeface="Arial" panose="020B0604020202020204" pitchFamily="34" charset="0"/>
+                <a:cs typeface="Arial" panose="020B0604020202020204" pitchFamily="34" charset="0"/>
+              </a:rPr>
+              <a:t/>
+            </a:r>
+            <a:br>
+              <a:rPr lang="en-US" sz="1200" dirty="0" smtClean="0">
+                <a:latin typeface="Arial" panose="020B0604020202020204" pitchFamily="34" charset="0"/>
+                <a:cs typeface="Arial" panose="020B0604020202020204" pitchFamily="34" charset="0"/>
+              </a:rPr>
+            </a:br>
+            <a:endParaRPr lang="en-US" sz="1200" dirty="0">
+              <a:latin typeface="Arial" panose="020B0604020202020204" pitchFamily="34" charset="0"/>
+              <a:cs typeface="Arial" panose="020B0604020202020204" pitchFamily="34" charset="0"/>
+            </a:endParaRPr>
+          </a:p>
+          <a:p>
+            <a:pPr>
+              <a:buClr>
+                <a:srgbClr val="00B0F0"/>
+              </a:buClr>
+              <a:buFont typeface="Courier New" panose="02070309020205020404" pitchFamily="49" charset="0"/>
+              <a:buChar char="o"/>
+            </a:pPr>
+            <a:r>
+              <a:rPr lang="en-US" sz="1200" dirty="0">
+                <a:latin typeface="Arial" panose="020B0604020202020204" pitchFamily="34" charset="0"/>
+                <a:cs typeface="Arial" panose="020B0604020202020204" pitchFamily="34" charset="0"/>
+                <a:hlinkClick r:id="rId3"/>
+              </a:rPr>
+              <a:t>http://</a:t>
+            </a:r>
+            <a:r>
+              <a:rPr lang="en-US" sz="1200" dirty="0" smtClean="0">
+                <a:latin typeface="Arial" panose="020B0604020202020204" pitchFamily="34" charset="0"/>
+                <a:cs typeface="Arial" panose="020B0604020202020204" pitchFamily="34" charset="0"/>
+                <a:hlinkClick r:id="rId3"/>
+              </a:rPr>
+              <a:t>msk-epam-diploma-dev.westeurope.cloudapp.azure.com</a:t>
+            </a:r>
+            <a:r>
+              <a:rPr lang="en-US" sz="1200" dirty="0" smtClean="0">
+                <a:latin typeface="Arial" panose="020B0604020202020204" pitchFamily="34" charset="0"/>
+                <a:cs typeface="Arial" panose="020B0604020202020204" pitchFamily="34" charset="0"/>
+              </a:rPr>
+              <a:t> – dev. environment (Azure)</a:t>
+            </a:r>
+            <a:r>
+              <a:rPr lang="en-US" sz="1200" dirty="0">
+                <a:latin typeface="Arial" panose="020B0604020202020204" pitchFamily="34" charset="0"/>
+                <a:cs typeface="Arial" panose="020B0604020202020204" pitchFamily="34" charset="0"/>
+              </a:rPr>
+              <a:t/>
+            </a:r>
+            <a:br>
+              <a:rPr lang="en-US" sz="1200" dirty="0">
+                <a:latin typeface="Arial" panose="020B0604020202020204" pitchFamily="34" charset="0"/>
+                <a:cs typeface="Arial" panose="020B0604020202020204" pitchFamily="34" charset="0"/>
+              </a:rPr>
+            </a:br>
+            <a:endParaRPr lang="en-US" sz="1200" dirty="0" smtClean="0">
+              <a:latin typeface="Arial" panose="020B0604020202020204" pitchFamily="34" charset="0"/>
+              <a:cs typeface="Arial" panose="020B0604020202020204" pitchFamily="34" charset="0"/>
+            </a:endParaRPr>
+          </a:p>
+          <a:p>
+            <a:pPr>
+              <a:buClr>
+                <a:srgbClr val="00B0F0"/>
+              </a:buClr>
+              <a:buFont typeface="Courier New" panose="02070309020205020404" pitchFamily="49" charset="0"/>
+              <a:buChar char="o"/>
+            </a:pPr>
+            <a:r>
+              <a:rPr lang="en-US" sz="1200" dirty="0">
+                <a:latin typeface="Arial" panose="020B0604020202020204" pitchFamily="34" charset="0"/>
+                <a:cs typeface="Arial" panose="020B0604020202020204" pitchFamily="34" charset="0"/>
+                <a:hlinkClick r:id="rId4"/>
+              </a:rPr>
+              <a:t>http://</a:t>
+            </a:r>
+            <a:r>
+              <a:rPr lang="en-US" sz="1200" dirty="0" smtClean="0">
+                <a:latin typeface="Arial" panose="020B0604020202020204" pitchFamily="34" charset="0"/>
+                <a:cs typeface="Arial" panose="020B0604020202020204" pitchFamily="34" charset="0"/>
+                <a:hlinkClick r:id="rId4"/>
+              </a:rPr>
+              <a:t>msk-epam-diploma-prod.westeurope.cloudapp.azure.com</a:t>
+            </a:r>
+            <a:r>
+              <a:rPr lang="en-US" sz="1200" dirty="0" smtClean="0">
+                <a:latin typeface="Arial" panose="020B0604020202020204" pitchFamily="34" charset="0"/>
+                <a:cs typeface="Arial" panose="020B0604020202020204" pitchFamily="34" charset="0"/>
+              </a:rPr>
+              <a:t> – prod. environment (Azure)</a:t>
+            </a:r>
+          </a:p>
+          <a:p>
+            <a:pPr>
+              <a:buClr>
+                <a:srgbClr val="00B0F0"/>
+              </a:buClr>
+              <a:buFont typeface="Courier New" panose="02070309020205020404" pitchFamily="49" charset="0"/>
+              <a:buChar char="o"/>
+            </a:pPr>
+            <a:endParaRPr lang="en-US" sz="1200" dirty="0">
+              <a:latin typeface="Arial" panose="020B0604020202020204" pitchFamily="34" charset="0"/>
+              <a:cs typeface="Arial" panose="020B0604020202020204" pitchFamily="34" charset="0"/>
+            </a:endParaRPr>
+          </a:p>
+          <a:p>
+            <a:pPr>
+              <a:buClr>
+                <a:srgbClr val="00B0F0"/>
+              </a:buClr>
+              <a:buFont typeface="Courier New" panose="02070309020205020404" pitchFamily="49" charset="0"/>
+              <a:buChar char="o"/>
+            </a:pPr>
+            <a:r>
+              <a:rPr lang="en-US" sz="1200" dirty="0">
+                <a:latin typeface="Arial" panose="020B0604020202020204" pitchFamily="34" charset="0"/>
+                <a:cs typeface="Arial" panose="020B0604020202020204" pitchFamily="34" charset="0"/>
+                <a:hlinkClick r:id="rId5"/>
+              </a:rPr>
+              <a:t>http://</a:t>
+            </a:r>
+            <a:r>
+              <a:rPr lang="en-US" sz="1200" dirty="0" smtClean="0">
+                <a:latin typeface="Arial" panose="020B0604020202020204" pitchFamily="34" charset="0"/>
+                <a:cs typeface="Arial" panose="020B0604020202020204" pitchFamily="34" charset="0"/>
+                <a:hlinkClick r:id="rId5"/>
+              </a:rPr>
+              <a:t>a2295b61bc0d64ed08f3058b4a60d4f0-527504591.eu-central-1.elb.amazonaws.com</a:t>
+            </a:r>
+            <a:r>
+              <a:rPr lang="en-US" sz="1200" dirty="0">
+                <a:latin typeface="Arial" panose="020B0604020202020204" pitchFamily="34" charset="0"/>
+                <a:cs typeface="Arial" panose="020B0604020202020204" pitchFamily="34" charset="0"/>
+              </a:rPr>
+              <a:t> </a:t>
+            </a:r>
+            <a:r>
+              <a:rPr lang="en-US" sz="1200" dirty="0" smtClean="0">
+                <a:latin typeface="Arial" panose="020B0604020202020204" pitchFamily="34" charset="0"/>
+                <a:cs typeface="Arial" panose="020B0604020202020204" pitchFamily="34" charset="0"/>
+              </a:rPr>
+              <a:t>– dev (AWS)</a:t>
+            </a:r>
+          </a:p>
+          <a:p>
+            <a:pPr>
+              <a:buClr>
+                <a:srgbClr val="00B0F0"/>
+              </a:buClr>
+              <a:buFont typeface="Courier New" panose="02070309020205020404" pitchFamily="49" charset="0"/>
+              <a:buChar char="o"/>
+            </a:pPr>
+            <a:endParaRPr lang="en-US" sz="1200" dirty="0" smtClean="0">
+              <a:latin typeface="Arial" panose="020B0604020202020204" pitchFamily="34" charset="0"/>
+              <a:cs typeface="Arial" panose="020B0604020202020204" pitchFamily="34" charset="0"/>
+            </a:endParaRPr>
+          </a:p>
+          <a:p>
+            <a:pPr>
+              <a:buClr>
+                <a:srgbClr val="00B0F0"/>
+              </a:buClr>
+              <a:buFont typeface="Courier New" panose="02070309020205020404" pitchFamily="49" charset="0"/>
+              <a:buChar char="o"/>
+            </a:pPr>
+            <a:r>
+              <a:rPr lang="en-US" sz="1200" dirty="0">
+                <a:latin typeface="Arial" panose="020B0604020202020204" pitchFamily="34" charset="0"/>
+                <a:cs typeface="Arial" panose="020B0604020202020204" pitchFamily="34" charset="0"/>
+                <a:hlinkClick r:id="rId6"/>
+              </a:rPr>
+              <a:t>http://</a:t>
+            </a:r>
+            <a:r>
+              <a:rPr lang="en-US" sz="1200" dirty="0" smtClean="0">
+                <a:latin typeface="Arial" panose="020B0604020202020204" pitchFamily="34" charset="0"/>
+                <a:cs typeface="Arial" panose="020B0604020202020204" pitchFamily="34" charset="0"/>
+                <a:hlinkClick r:id="rId6"/>
+              </a:rPr>
+              <a:t>a492d30ddcd5e4c37ab112d1383585bd-1162393560.eu-central-1.elb.amazonaws.com</a:t>
+            </a:r>
+            <a:r>
+              <a:rPr lang="en-US" sz="1200" dirty="0" smtClean="0">
+                <a:latin typeface="Arial" panose="020B0604020202020204" pitchFamily="34" charset="0"/>
+                <a:cs typeface="Arial" panose="020B0604020202020204" pitchFamily="34" charset="0"/>
+              </a:rPr>
+              <a:t> – prod (AWS)</a:t>
+            </a:r>
+          </a:p>
+          <a:p>
+            <a:pPr marL="0" indent="0">
+              <a:buClr>
+                <a:srgbClr val="00B0F0"/>
+              </a:buClr>
+              <a:buNone/>
+            </a:pPr>
+            <a:r>
+              <a:rPr lang="en-US" sz="1200" dirty="0">
+                <a:latin typeface="Arial" panose="020B0604020202020204" pitchFamily="34" charset="0"/>
+                <a:cs typeface="Arial" panose="020B0604020202020204" pitchFamily="34" charset="0"/>
+              </a:rPr>
+              <a:t/>
+            </a:r>
+            <a:br>
+              <a:rPr lang="en-US" sz="1200" dirty="0">
+                <a:latin typeface="Arial" panose="020B0604020202020204" pitchFamily="34" charset="0"/>
+                <a:cs typeface="Arial" panose="020B0604020202020204" pitchFamily="34" charset="0"/>
+              </a:rPr>
+            </a:br>
+            <a:r>
+              <a:rPr lang="en-US" sz="1200" dirty="0" smtClean="0">
+                <a:latin typeface="Arial" panose="020B0604020202020204" pitchFamily="34" charset="0"/>
+                <a:cs typeface="Arial" panose="020B0604020202020204" pitchFamily="34" charset="0"/>
+              </a:rPr>
+              <a:t/>
+            </a:r>
+            <a:br>
+              <a:rPr lang="en-US" sz="1200" dirty="0" smtClean="0">
+                <a:latin typeface="Arial" panose="020B0604020202020204" pitchFamily="34" charset="0"/>
+                <a:cs typeface="Arial" panose="020B0604020202020204" pitchFamily="34" charset="0"/>
+              </a:rPr>
+            </a:br>
+            <a:endParaRPr lang="en-US" sz="1200" dirty="0" smtClean="0">
+              <a:latin typeface="Arial" panose="020B0604020202020204" pitchFamily="34" charset="0"/>
+              <a:cs typeface="Arial" panose="020B0604020202020204" pitchFamily="34" charset="0"/>
+            </a:endParaRPr>
+          </a:p>
+          <a:p>
+            <a:pPr marL="0" indent="0">
+              <a:buClr>
+                <a:srgbClr val="00B0F0"/>
+              </a:buClr>
+              <a:buNone/>
+            </a:pPr>
+            <a:endParaRPr lang="ru-RU" sz="1050" dirty="0"/>
+          </a:p>
+        </p:txBody>
+      </p:sp>
+      <p:sp>
+        <p:nvSpPr>
+          <p:cNvPr id="5" name="Номер слайда 4">
+            <a:extLst>
+              <a:ext uri="{FF2B5EF4-FFF2-40B4-BE49-F238E27FC236}">
+                <a16:creationId xmlns:a16="http://schemas.microsoft.com/office/drawing/2014/main" id="{36390377-B22D-4322-8494-A33AE2C57C0E}"/>
+              </a:ext>
+            </a:extLst>
+          </p:cNvPr>
+          <p:cNvSpPr>
+            <a:spLocks noGrp="1"/>
+          </p:cNvSpPr>
+          <p:nvPr>
+            <p:ph type="sldNum" sz="quarter" idx="4"/>
+          </p:nvPr>
+        </p:nvSpPr>
+        <p:spPr/>
+        <p:txBody>
+          <a:bodyPr/>
+          <a:lstStyle/>
+          <a:p>
+            <a:fld id="{3A707DD9-E92B-45E8-BE0A-E6B2EDF345EB}" type="slidenum">
+              <a:rPr lang="en-US" smtClean="0"/>
+              <a:pPr/>
+              <a:t>7</a:t>
+            </a:fld>
+            <a:endParaRPr lang="en-US" dirty="0"/>
+          </a:p>
+        </p:txBody>
+      </p:sp>
+    </p:spTree>
+    <p:extLst>
+      <p:ext uri="{BB962C8B-B14F-4D97-AF65-F5344CB8AC3E}">
+        <p14:creationId xmlns:p14="http://schemas.microsoft.com/office/powerpoint/2010/main" val="697907956"/>
       </p:ext>
     </p:extLst>
   </p:cSld>
@@ -24149,6 +24429,68 @@
 </file>
 
 <file path=customXml/item2.xml><?xml version="1.0" encoding="utf-8"?>
+<p:properties xmlns:p="http://schemas.microsoft.com/office/2006/metadata/properties" xmlns:xsi="http://www.w3.org/2001/XMLSchema-instance" xmlns:pc="http://schemas.microsoft.com/office/infopath/2007/PartnerControls">
+  <documentManagement>
+    <_dlc_DocId xmlns="5ede5379-f79c-4964-9301-1140f96aa672">DOCID-1506477047-7228</_dlc_DocId>
+    <_dlc_DocIdUrl xmlns="5ede5379-f79c-4964-9301-1140f96aa672">
+      <Url>https://epam.sharepoint.com/sites/LMSO/_layouts/15/DocIdRedir.aspx?ID=DOCID-1506477047-7228</Url>
+      <Description>DOCID-1506477047-7228</Description>
+    </_dlc_DocIdUrl>
+  </documentManagement>
+</p:properties>
+</file>
+
+<file path=customXml/item3.xml><?xml version="1.0" encoding="utf-8"?>
+<?mso-contentType ?>
+<spe:Receivers xmlns:spe="http://schemas.microsoft.com/sharepoint/events">
+  <Receiver>
+    <Name>Document ID Generator</Name>
+    <Synchronization>Synchronous</Synchronization>
+    <Type>10001</Type>
+    <SequenceNumber>1000</SequenceNumber>
+    <Url/>
+    <Assembly>Microsoft.Office.DocumentManagement, Version=16.0.0.0, Culture=neutral, PublicKeyToken=71e9bce111e9429c</Assembly>
+    <Class>Microsoft.Office.DocumentManagement.Internal.DocIdHandler</Class>
+    <Data/>
+    <Filter/>
+  </Receiver>
+  <Receiver>
+    <Name>Document ID Generator</Name>
+    <Synchronization>Synchronous</Synchronization>
+    <Type>10002</Type>
+    <SequenceNumber>1001</SequenceNumber>
+    <Url/>
+    <Assembly>Microsoft.Office.DocumentManagement, Version=16.0.0.0, Culture=neutral, PublicKeyToken=71e9bce111e9429c</Assembly>
+    <Class>Microsoft.Office.DocumentManagement.Internal.DocIdHandler</Class>
+    <Data/>
+    <Filter/>
+  </Receiver>
+  <Receiver>
+    <Name>Document ID Generator</Name>
+    <Synchronization>Synchronous</Synchronization>
+    <Type>10004</Type>
+    <SequenceNumber>1002</SequenceNumber>
+    <Url/>
+    <Assembly>Microsoft.Office.DocumentManagement, Version=16.0.0.0, Culture=neutral, PublicKeyToken=71e9bce111e9429c</Assembly>
+    <Class>Microsoft.Office.DocumentManagement.Internal.DocIdHandler</Class>
+    <Data/>
+    <Filter/>
+  </Receiver>
+  <Receiver>
+    <Name>Document ID Generator</Name>
+    <Synchronization>Synchronous</Synchronization>
+    <Type>10006</Type>
+    <SequenceNumber>1003</SequenceNumber>
+    <Url/>
+    <Assembly>Microsoft.Office.DocumentManagement, Version=16.0.0.0, Culture=neutral, PublicKeyToken=71e9bce111e9429c</Assembly>
+    <Class>Microsoft.Office.DocumentManagement.Internal.DocIdHandler</Class>
+    <Data/>
+    <Filter/>
+  </Receiver>
+</spe:Receivers>
+</file>
+
+<file path=customXml/item4.xml><?xml version="1.0" encoding="utf-8"?>
 <ct:contentTypeSchema xmlns:ct="http://schemas.microsoft.com/office/2006/metadata/contentType" xmlns:ma="http://schemas.microsoft.com/office/2006/metadata/properties/metaAttributes" ct:_="" ma:_="" ma:contentTypeName="Document" ma:contentTypeID="0x010100A8D4E6613F5B634CB601A095784E7618" ma:contentTypeVersion="9" ma:contentTypeDescription="Create a new document." ma:contentTypeScope="" ma:versionID="72e755e35a7d14a9c759467478be150d">
   <xsd:schema xmlns:xsd="http://www.w3.org/2001/XMLSchema" xmlns:xs="http://www.w3.org/2001/XMLSchema" xmlns:p="http://schemas.microsoft.com/office/2006/metadata/properties" xmlns:ns2="5ede5379-f79c-4964-9301-1140f96aa672" xmlns:ns3="9b994499-688a-4c81-bb09-d15746d9e4fa" targetNamespace="http://schemas.microsoft.com/office/2006/metadata/properties" ma:root="true" ma:fieldsID="90b81c0305bd8476b889bec028dbafbe" ns2:_="" ns3:_="">
     <xsd:import namespace="5ede5379-f79c-4964-9301-1140f96aa672"/>
@@ -24356,68 +24698,6 @@
 </ct:contentTypeSchema>
 </file>
 
-<file path=customXml/item3.xml><?xml version="1.0" encoding="utf-8"?>
-<?mso-contentType ?>
-<spe:Receivers xmlns:spe="http://schemas.microsoft.com/sharepoint/events">
-  <Receiver>
-    <Name>Document ID Generator</Name>
-    <Synchronization>Synchronous</Synchronization>
-    <Type>10001</Type>
-    <SequenceNumber>1000</SequenceNumber>
-    <Url/>
-    <Assembly>Microsoft.Office.DocumentManagement, Version=16.0.0.0, Culture=neutral, PublicKeyToken=71e9bce111e9429c</Assembly>
-    <Class>Microsoft.Office.DocumentManagement.Internal.DocIdHandler</Class>
-    <Data/>
-    <Filter/>
-  </Receiver>
-  <Receiver>
-    <Name>Document ID Generator</Name>
-    <Synchronization>Synchronous</Synchronization>
-    <Type>10002</Type>
-    <SequenceNumber>1001</SequenceNumber>
-    <Url/>
-    <Assembly>Microsoft.Office.DocumentManagement, Version=16.0.0.0, Culture=neutral, PublicKeyToken=71e9bce111e9429c</Assembly>
-    <Class>Microsoft.Office.DocumentManagement.Internal.DocIdHandler</Class>
-    <Data/>
-    <Filter/>
-  </Receiver>
-  <Receiver>
-    <Name>Document ID Generator</Name>
-    <Synchronization>Synchronous</Synchronization>
-    <Type>10004</Type>
-    <SequenceNumber>1002</SequenceNumber>
-    <Url/>
-    <Assembly>Microsoft.Office.DocumentManagement, Version=16.0.0.0, Culture=neutral, PublicKeyToken=71e9bce111e9429c</Assembly>
-    <Class>Microsoft.Office.DocumentManagement.Internal.DocIdHandler</Class>
-    <Data/>
-    <Filter/>
-  </Receiver>
-  <Receiver>
-    <Name>Document ID Generator</Name>
-    <Synchronization>Synchronous</Synchronization>
-    <Type>10006</Type>
-    <SequenceNumber>1003</SequenceNumber>
-    <Url/>
-    <Assembly>Microsoft.Office.DocumentManagement, Version=16.0.0.0, Culture=neutral, PublicKeyToken=71e9bce111e9429c</Assembly>
-    <Class>Microsoft.Office.DocumentManagement.Internal.DocIdHandler</Class>
-    <Data/>
-    <Filter/>
-  </Receiver>
-</spe:Receivers>
-</file>
-
-<file path=customXml/item4.xml><?xml version="1.0" encoding="utf-8"?>
-<p:properties xmlns:p="http://schemas.microsoft.com/office/2006/metadata/properties" xmlns:xsi="http://www.w3.org/2001/XMLSchema-instance" xmlns:pc="http://schemas.microsoft.com/office/infopath/2007/PartnerControls">
-  <documentManagement>
-    <_dlc_DocId xmlns="5ede5379-f79c-4964-9301-1140f96aa672">DOCID-1506477047-7228</_dlc_DocId>
-    <_dlc_DocIdUrl xmlns="5ede5379-f79c-4964-9301-1140f96aa672">
-      <Url>https://epam.sharepoint.com/sites/LMSO/_layouts/15/DocIdRedir.aspx?ID=DOCID-1506477047-7228</Url>
-      <Description>DOCID-1506477047-7228</Description>
-    </_dlc_DocIdUrl>
-  </documentManagement>
-</p:properties>
-</file>
-
 <file path=customXml/itemProps1.xml><?xml version="1.0" encoding="utf-8"?>
 <ds:datastoreItem xmlns:ds="http://schemas.openxmlformats.org/officeDocument/2006/customXml" ds:itemID="{CA4523BA-9821-4FA2-8798-E509F40B7CD8}">
   <ds:schemaRefs>
@@ -24427,6 +24707,31 @@
 </file>
 
 <file path=customXml/itemProps2.xml><?xml version="1.0" encoding="utf-8"?>
+<ds:datastoreItem xmlns:ds="http://schemas.openxmlformats.org/officeDocument/2006/customXml" ds:itemID="{E03F9C2E-10ED-46EF-B255-8CABB5FAB17E}">
+  <ds:schemaRefs>
+    <ds:schemaRef ds:uri="http://schemas.microsoft.com/office/infopath/2007/PartnerControls"/>
+    <ds:schemaRef ds:uri="http://purl.org/dc/elements/1.1/"/>
+    <ds:schemaRef ds:uri="http://schemas.microsoft.com/office/2006/documentManagement/types"/>
+    <ds:schemaRef ds:uri="http://purl.org/dc/terms/"/>
+    <ds:schemaRef ds:uri="9b994499-688a-4c81-bb09-d15746d9e4fa"/>
+    <ds:schemaRef ds:uri="http://purl.org/dc/dcmitype/"/>
+    <ds:schemaRef ds:uri="http://www.w3.org/XML/1998/namespace"/>
+    <ds:schemaRef ds:uri="http://schemas.microsoft.com/office/2006/metadata/properties"/>
+    <ds:schemaRef ds:uri="http://schemas.openxmlformats.org/package/2006/metadata/core-properties"/>
+    <ds:schemaRef ds:uri="5ede5379-f79c-4964-9301-1140f96aa672"/>
+  </ds:schemaRefs>
+</ds:datastoreItem>
+</file>
+
+<file path=customXml/itemProps3.xml><?xml version="1.0" encoding="utf-8"?>
+<ds:datastoreItem xmlns:ds="http://schemas.openxmlformats.org/officeDocument/2006/customXml" ds:itemID="{B11AD243-B57F-4D21-9682-3A885D100858}">
+  <ds:schemaRefs>
+    <ds:schemaRef ds:uri="http://schemas.microsoft.com/sharepoint/events"/>
+  </ds:schemaRefs>
+</ds:datastoreItem>
+</file>
+
+<file path=customXml/itemProps4.xml><?xml version="1.0" encoding="utf-8"?>
 <ds:datastoreItem xmlns:ds="http://schemas.openxmlformats.org/officeDocument/2006/customXml" ds:itemID="{5261CC8E-BF3B-4C28-82E8-A81C3651744D}">
   <ds:schemaRefs>
     <ds:schemaRef ds:uri="http://schemas.microsoft.com/office/2006/metadata/contentType"/>
@@ -24443,29 +24748,4 @@
     <ds:schemaRef ds:uri="http://schemas.microsoft.com/internal/obd"/>
   </ds:schemaRefs>
 </ds:datastoreItem>
-</file>
-
-<file path=customXml/itemProps3.xml><?xml version="1.0" encoding="utf-8"?>
-<ds:datastoreItem xmlns:ds="http://schemas.openxmlformats.org/officeDocument/2006/customXml" ds:itemID="{B11AD243-B57F-4D21-9682-3A885D100858}">
-  <ds:schemaRefs>
-    <ds:schemaRef ds:uri="http://schemas.microsoft.com/sharepoint/events"/>
-  </ds:schemaRefs>
-</ds:datastoreItem>
-</file>
-
-<file path=customXml/itemProps4.xml><?xml version="1.0" encoding="utf-8"?>
-<ds:datastoreItem xmlns:ds="http://schemas.openxmlformats.org/officeDocument/2006/customXml" ds:itemID="{E03F9C2E-10ED-46EF-B255-8CABB5FAB17E}">
-  <ds:schemaRefs>
-    <ds:schemaRef ds:uri="http://schemas.microsoft.com/office/infopath/2007/PartnerControls"/>
-    <ds:schemaRef ds:uri="http://purl.org/dc/elements/1.1/"/>
-    <ds:schemaRef ds:uri="http://schemas.microsoft.com/office/2006/documentManagement/types"/>
-    <ds:schemaRef ds:uri="http://purl.org/dc/terms/"/>
-    <ds:schemaRef ds:uri="9b994499-688a-4c81-bb09-d15746d9e4fa"/>
-    <ds:schemaRef ds:uri="http://purl.org/dc/dcmitype/"/>
-    <ds:schemaRef ds:uri="http://www.w3.org/XML/1998/namespace"/>
-    <ds:schemaRef ds:uri="http://schemas.microsoft.com/office/2006/metadata/properties"/>
-    <ds:schemaRef ds:uri="http://schemas.openxmlformats.org/package/2006/metadata/core-properties"/>
-    <ds:schemaRef ds:uri="5ede5379-f79c-4964-9301-1140f96aa672"/>
-  </ds:schemaRefs>
-</ds:datastoreItem>
 </file>
</xml_diff>